<commit_message>
[Refactor] Update sample and presentation
</commit_message>
<xml_diff>
--- a/gab/mumbai 2023/presentation/Courage In Chaos - Microsoft Azure.pptx
+++ b/gab/mumbai 2023/presentation/Courage In Chaos - Microsoft Azure.pptx
@@ -22,7 +22,7 @@
     <p:sldId id="3780" r:id="rId13"/>
     <p:sldId id="338" r:id="rId14"/>
     <p:sldId id="3785" r:id="rId15"/>
-    <p:sldId id="3773" r:id="rId16"/>
+    <p:sldId id="3786" r:id="rId16"/>
     <p:sldId id="3737" r:id="rId17"/>
   </p:sldIdLst>
   <p:sldSz cx="12192000" cy="6858000"/>
@@ -139,6 +139,7 @@
     <p1510:client id="{2196F574-505F-452C-BF07-5285D9246300}" v="1233" dt="2023-05-03T16:55:15.675"/>
     <p1510:client id="{2B68C038-8D22-4B6E-85CC-DB43D6EE3788}" v="62" dt="2023-05-07T09:25:37.036"/>
     <p1510:client id="{3C73E943-72EB-4543-98A7-1AC88893FFCC}" v="14" dt="2021-03-04T19:11:00.896"/>
+    <p1510:client id="{5873C4D6-1ED4-4C9C-B9FF-2624EE27598A}" v="1010" dt="2023-05-07T14:29:44.555"/>
     <p1510:client id="{667ED40A-A733-46A2-9CA9-3A1CE85E3813}" v="60" dt="2021-03-04T19:05:56.845"/>
     <p1510:client id="{84422772-832C-4BD1-AF9C-612593AF0B0E}" v="4263" dt="2023-05-07T09:20:37.251"/>
   </p1510:revLst>
@@ -737,7 +738,7 @@
           <a:p>
             <a:fld id="{386CE63F-9E7F-4C04-9D0D-FCA25A8E9E86}" type="datetime8">
               <a:rPr lang="en-US" smtClean="0"/>
-              <a:t>5/7/2023 2:24 AM</a:t>
+              <a:t>5/7/2023 7:06 AM</a:t>
             </a:fld>
             <a:endParaRPr lang="en-US" dirty="0"/>
           </a:p>
@@ -1034,7 +1035,7 @@
           <a:p>
             <a:fld id="{386CE63F-9E7F-4C04-9D0D-FCA25A8E9E86}" type="datetime8">
               <a:rPr lang="en-US" smtClean="0"/>
-              <a:t>5/7/2023 2:24 AM</a:t>
+              <a:t>5/7/2023 7:06 AM</a:t>
             </a:fld>
             <a:endParaRPr lang="en-US" dirty="0"/>
           </a:p>
@@ -1235,7 +1236,7 @@
           <a:p>
             <a:fld id="{386CE63F-9E7F-4C04-9D0D-FCA25A8E9E86}" type="datetime8">
               <a:rPr lang="en-US" smtClean="0"/>
-              <a:t>5/7/2023 2:24 AM</a:t>
+              <a:t>5/7/2023 7:06 AM</a:t>
             </a:fld>
             <a:endParaRPr lang="en-US" dirty="0"/>
           </a:p>
@@ -1324,7 +1325,7 @@
           <a:p>
             <a:r>
               <a:rPr lang="en-US" dirty="0"/>
-              <a:t>Let’s summarize what we should be doing next</a:t>
+              <a:t>Alright so here are some thoughts around why is DevOps important?</a:t>
             </a:r>
           </a:p>
           <a:p>
@@ -1332,160 +1333,144 @@
           </a:p>
           <a:p>
             <a:r>
-              <a:rPr lang="en-US" dirty="0"/>
-              <a:t>- Do not dig a well when you get thirsty, be proactive and have the readiness</a:t>
-            </a:r>
-          </a:p>
-          <a:p>
-            <a:endParaRPr lang="en-US" dirty="0"/>
-          </a:p>
-          <a:p>
-            <a:pPr marL="171450" indent="-171450">
-              <a:buFontTx/>
-              <a:buChar char="-"/>
-            </a:pPr>
-            <a:r>
-              <a:rPr lang="en-US" dirty="0"/>
-              <a:t>Make use of communication tools and stay productive everyday</a:t>
-            </a:r>
-          </a:p>
-          <a:p>
-            <a:pPr marL="171450" indent="-171450">
-              <a:buFontTx/>
-              <a:buChar char="-"/>
-            </a:pPr>
-            <a:endParaRPr lang="en-US" dirty="0"/>
-          </a:p>
-          <a:p>
-            <a:pPr marL="171450" indent="-171450">
-              <a:buFontTx/>
-              <a:buChar char="-"/>
-            </a:pPr>
-            <a:r>
-              <a:rPr lang="en-US" dirty="0"/>
-              <a:t>Make the stakeholder participate and deliver priority items first</a:t>
-            </a:r>
-          </a:p>
-          <a:p>
-            <a:pPr marL="171450" indent="-171450">
-              <a:buFontTx/>
-              <a:buChar char="-"/>
-            </a:pPr>
-            <a:endParaRPr lang="en-US" dirty="0"/>
-          </a:p>
-          <a:p>
-            <a:r>
-              <a:rPr lang="en-US" dirty="0"/>
-              <a:t>To summarize</a:t>
-            </a:r>
-          </a:p>
-          <a:p>
-            <a:endParaRPr lang="en-US" dirty="0"/>
-          </a:p>
-          <a:p>
-            <a:r>
-              <a:rPr lang="en-US" dirty="0"/>
-              <a:t>Alright, I hope this action packed demo gave you some insights on how would you try and deliver success for your customers.</a:t>
-            </a:r>
-          </a:p>
-          <a:p>
-            <a:endParaRPr lang="en-US" dirty="0"/>
-          </a:p>
-          <a:p>
-            <a:r>
-              <a:rPr lang="en-US" dirty="0"/>
-              <a:t>Thank you for coming by, have a great day ahead</a:t>
-            </a:r>
-          </a:p>
-        </p:txBody>
-      </p:sp>
-      <p:sp>
-        <p:nvSpPr>
-          <p:cNvPr id="4" name="Slide Number Placeholder 3"/>
-          <p:cNvSpPr>
-            <a:spLocks noGrp="1"/>
-          </p:cNvSpPr>
-          <p:nvPr>
-            <p:ph type="sldNum" sz="quarter" idx="10"/>
-          </p:nvPr>
-        </p:nvSpPr>
-        <p:spPr/>
-        <p:txBody>
-          <a:bodyPr/>
-          <a:lstStyle/>
-          <a:p>
-            <a:pPr marL="0" marR="0" lvl="0" indent="0" algn="r" defTabSz="932688" rtl="0" eaLnBrk="1" fontAlgn="auto" latinLnBrk="0" hangingPunct="1">
-              <a:lnSpc>
-                <a:spcPct val="100000"/>
-              </a:lnSpc>
-              <a:spcBef>
-                <a:spcPts val="0"/>
-              </a:spcBef>
-              <a:spcAft>
-                <a:spcPts val="0"/>
-              </a:spcAft>
-              <a:buClrTx/>
-              <a:buSzTx/>
-              <a:buFontTx/>
-              <a:buNone/>
-              <a:tabLst/>
-              <a:defRPr/>
-            </a:pPr>
-            <a:fld id="{5F2D3714-B553-A044-BA72-366907BA36B5}" type="slidenum">
-              <a:rPr kumimoji="0" lang="en-US" sz="1200" b="0" i="0" u="none" strike="noStrike" kern="1200" cap="none" spc="0" normalizeH="0" baseline="0" noProof="0" smtClean="0">
-                <a:ln>
-                  <a:noFill/>
-                </a:ln>
+              <a:rPr lang="en-IN" sz="882" b="0" i="0" u="none" strike="noStrike" kern="1200" dirty="0">
                 <a:solidFill>
-                  <a:prstClr val="black"/>
+                  <a:schemeClr val="tx1"/>
                 </a:solidFill>
                 <a:effectLst/>
-                <a:uLnTx/>
-                <a:uFillTx/>
-                <a:latin typeface="Calibri" panose="020F0502020204030204"/>
+                <a:latin typeface="Segoe UI Light" pitchFamily="34" charset="0"/>
                 <a:ea typeface="+mn-ea"/>
                 <a:cs typeface="+mn-cs"/>
               </a:rPr>
-              <a:pPr marL="0" marR="0" lvl="0" indent="0" algn="r" defTabSz="932688" rtl="0" eaLnBrk="1" fontAlgn="auto" latinLnBrk="0" hangingPunct="1">
-                <a:lnSpc>
-                  <a:spcPct val="100000"/>
-                </a:lnSpc>
-                <a:spcBef>
-                  <a:spcPts val="0"/>
-                </a:spcBef>
-                <a:spcAft>
-                  <a:spcPts val="0"/>
-                </a:spcAft>
-                <a:buClrTx/>
-                <a:buSzTx/>
-                <a:buFontTx/>
-                <a:buNone/>
-                <a:tabLst/>
-                <a:defRPr/>
-              </a:pPr>
+              <a:t>DevOps promises speed: delivering value to customers, reducing cycle time, faster time to market, shorter mean-time-to-resolution.</a:t>
+            </a:r>
+          </a:p>
+        </p:txBody>
+      </p:sp>
+      <p:sp>
+        <p:nvSpPr>
+          <p:cNvPr id="4" name="Header Placeholder 3"/>
+          <p:cNvSpPr>
+            <a:spLocks noGrp="1"/>
+          </p:cNvSpPr>
+          <p:nvPr>
+            <p:ph type="hdr" sz="quarter"/>
+          </p:nvPr>
+        </p:nvSpPr>
+        <p:spPr/>
+        <p:txBody>
+          <a:bodyPr/>
+          <a:lstStyle/>
+          <a:p>
+            <a:endParaRPr lang="en-US" dirty="0"/>
+          </a:p>
+        </p:txBody>
+      </p:sp>
+      <p:sp>
+        <p:nvSpPr>
+          <p:cNvPr id="5" name="Footer Placeholder 4"/>
+          <p:cNvSpPr>
+            <a:spLocks noGrp="1"/>
+          </p:cNvSpPr>
+          <p:nvPr>
+            <p:ph type="ftr" sz="quarter" idx="4"/>
+          </p:nvPr>
+        </p:nvSpPr>
+        <p:spPr/>
+        <p:txBody>
+          <a:bodyPr/>
+          <a:lstStyle/>
+          <a:p>
+            <a:pPr defTabSz="914099" eaLnBrk="0" hangingPunct="0"/>
+            <a:r>
+              <a:rPr lang="en-US" sz="400">
+                <a:gradFill>
+                  <a:gsLst>
+                    <a:gs pos="0">
+                      <a:prstClr val="black"/>
+                    </a:gs>
+                    <a:gs pos="100000">
+                      <a:prstClr val="black"/>
+                    </a:gs>
+                  </a:gsLst>
+                  <a:lin ang="5400000" scaled="0"/>
+                </a:gradFill>
+                <a:latin typeface="Segoe UI" pitchFamily="34" charset="0"/>
+                <a:ea typeface="Segoe UI" pitchFamily="34" charset="0"/>
+                <a:cs typeface="Segoe UI" pitchFamily="34" charset="0"/>
+              </a:rPr>
+              <a:t>© Microsoft Corporation. All rights reserved. MICROSOFT MAKES NO WARRANTIES, EXPRESS, IMPLIED OR STATUTORY, AS TO THE INFORMATION IN THIS PRESENTATION.</a:t>
+            </a:r>
+            <a:endParaRPr lang="en-US" sz="400" dirty="0">
+              <a:gradFill>
+                <a:gsLst>
+                  <a:gs pos="0">
+                    <a:prstClr val="black"/>
+                  </a:gs>
+                  <a:gs pos="100000">
+                    <a:prstClr val="black"/>
+                  </a:gs>
+                </a:gsLst>
+                <a:lin ang="5400000" scaled="0"/>
+              </a:gradFill>
+              <a:latin typeface="Segoe UI" pitchFamily="34" charset="0"/>
+              <a:ea typeface="Segoe UI" pitchFamily="34" charset="0"/>
+              <a:cs typeface="Segoe UI" pitchFamily="34" charset="0"/>
+            </a:endParaRPr>
+          </a:p>
+        </p:txBody>
+      </p:sp>
+      <p:sp>
+        <p:nvSpPr>
+          <p:cNvPr id="6" name="Date Placeholder 5"/>
+          <p:cNvSpPr>
+            <a:spLocks noGrp="1"/>
+          </p:cNvSpPr>
+          <p:nvPr>
+            <p:ph type="dt" idx="1"/>
+          </p:nvPr>
+        </p:nvSpPr>
+        <p:spPr/>
+        <p:txBody>
+          <a:bodyPr/>
+          <a:lstStyle/>
+          <a:p>
+            <a:fld id="{386CE63F-9E7F-4C04-9D0D-FCA25A8E9E86}" type="datetime8">
+              <a:rPr lang="en-US" smtClean="0"/>
+              <a:t>5/7/2023 7:16 AM</a:t>
+            </a:fld>
+            <a:endParaRPr lang="en-US" dirty="0"/>
+          </a:p>
+        </p:txBody>
+      </p:sp>
+      <p:sp>
+        <p:nvSpPr>
+          <p:cNvPr id="7" name="Slide Number Placeholder 6"/>
+          <p:cNvSpPr>
+            <a:spLocks noGrp="1"/>
+          </p:cNvSpPr>
+          <p:nvPr>
+            <p:ph type="sldNum" sz="quarter" idx="5"/>
+          </p:nvPr>
+        </p:nvSpPr>
+        <p:spPr/>
+        <p:txBody>
+          <a:bodyPr/>
+          <a:lstStyle/>
+          <a:p>
+            <a:fld id="{B4008EB6-D09E-4580-8CD6-DDB14511944F}" type="slidenum">
+              <a:rPr lang="en-US" smtClean="0"/>
+              <a:pPr/>
               <a:t>15</a:t>
             </a:fld>
-            <a:endParaRPr kumimoji="0" lang="en-US" sz="1200" b="0" i="0" u="none" strike="noStrike" kern="1200" cap="none" spc="0" normalizeH="0" baseline="0" noProof="0">
-              <a:ln>
-                <a:noFill/>
-              </a:ln>
-              <a:solidFill>
-                <a:prstClr val="black"/>
-              </a:solidFill>
-              <a:effectLst/>
-              <a:uLnTx/>
-              <a:uFillTx/>
-              <a:latin typeface="Calibri" panose="020F0502020204030204"/>
-              <a:ea typeface="+mn-ea"/>
-              <a:cs typeface="+mn-cs"/>
-            </a:endParaRPr>
+            <a:endParaRPr lang="en-US" dirty="0"/>
           </a:p>
         </p:txBody>
       </p:sp>
     </p:spTree>
     <p:extLst>
       <p:ext uri="{BB962C8B-B14F-4D97-AF65-F5344CB8AC3E}">
-        <p14:creationId xmlns:p14="http://schemas.microsoft.com/office/powerpoint/2010/main" val="3043191487"/>
+        <p14:creationId xmlns:p14="http://schemas.microsoft.com/office/powerpoint/2010/main" val="2796062287"/>
       </p:ext>
     </p:extLst>
   </p:cSld>
@@ -1955,7 +1940,7 @@
           <a:p>
             <a:fld id="{386CE63F-9E7F-4C04-9D0D-FCA25A8E9E86}" type="datetime8">
               <a:rPr lang="en-US" smtClean="0"/>
-              <a:t>5/7/2023 2:24 AM</a:t>
+              <a:t>5/7/2023 7:06 AM</a:t>
             </a:fld>
             <a:endParaRPr lang="en-US" dirty="0"/>
           </a:p>
@@ -2156,7 +2141,7 @@
           <a:p>
             <a:fld id="{386CE63F-9E7F-4C04-9D0D-FCA25A8E9E86}" type="datetime8">
               <a:rPr lang="en-US" smtClean="0"/>
-              <a:t>5/7/2023 2:24 AM</a:t>
+              <a:t>5/7/2023 7:06 AM</a:t>
             </a:fld>
             <a:endParaRPr lang="en-US" dirty="0"/>
           </a:p>
@@ -2357,7 +2342,7 @@
           <a:p>
             <a:fld id="{386CE63F-9E7F-4C04-9D0D-FCA25A8E9E86}" type="datetime8">
               <a:rPr lang="en-US" smtClean="0"/>
-              <a:t>5/7/2023 2:24 AM</a:t>
+              <a:t>5/7/2023 7:06 AM</a:t>
             </a:fld>
             <a:endParaRPr lang="en-US" dirty="0"/>
           </a:p>
@@ -2560,7 +2545,7 @@
           <a:p>
             <a:fld id="{386CE63F-9E7F-4C04-9D0D-FCA25A8E9E86}" type="datetime8">
               <a:rPr lang="en-US" smtClean="0"/>
-              <a:t>5/7/2023 2:24 AM</a:t>
+              <a:t>5/7/2023 7:06 AM</a:t>
             </a:fld>
             <a:endParaRPr lang="en-US" dirty="0"/>
           </a:p>
@@ -2761,7 +2746,7 @@
           <a:p>
             <a:fld id="{386CE63F-9E7F-4C04-9D0D-FCA25A8E9E86}" type="datetime8">
               <a:rPr lang="en-US" smtClean="0"/>
-              <a:t>5/7/2023 2:24 AM</a:t>
+              <a:t>5/7/2023 7:06 AM</a:t>
             </a:fld>
             <a:endParaRPr lang="en-US" dirty="0"/>
           </a:p>
@@ -2962,7 +2947,7 @@
           <a:p>
             <a:fld id="{386CE63F-9E7F-4C04-9D0D-FCA25A8E9E86}" type="datetime8">
               <a:rPr lang="en-US" smtClean="0"/>
-              <a:t>5/7/2023 2:24 AM</a:t>
+              <a:t>5/7/2023 7:06 AM</a:t>
             </a:fld>
             <a:endParaRPr lang="en-US" dirty="0"/>
           </a:p>
@@ -3163,7 +3148,7 @@
           <a:p>
             <a:fld id="{386CE63F-9E7F-4C04-9D0D-FCA25A8E9E86}" type="datetime8">
               <a:rPr lang="en-US" smtClean="0"/>
-              <a:t>5/7/2023 2:24 AM</a:t>
+              <a:t>5/7/2023 7:06 AM</a:t>
             </a:fld>
             <a:endParaRPr lang="en-US" dirty="0"/>
           </a:p>
@@ -12832,13 +12817,7 @@
       </p:grpSpPr>
       <p:sp>
         <p:nvSpPr>
-          <p:cNvPr id="2" name="Title 1">
-            <a:extLst>
-              <a:ext uri="{FF2B5EF4-FFF2-40B4-BE49-F238E27FC236}">
-                <a16:creationId xmlns:a16="http://schemas.microsoft.com/office/drawing/2014/main" id="{7E0B1E42-2E30-4862-8919-84E80A7D530A}"/>
-              </a:ext>
-            </a:extLst>
-          </p:cNvPr>
+          <p:cNvPr id="4" name="Title 3"/>
           <p:cNvSpPr>
             <a:spLocks noGrp="1"/>
           </p:cNvSpPr>
@@ -12852,787 +12831,329 @@
           <a:lstStyle/>
           <a:p>
             <a:r>
-              <a:rPr lang="en-US" dirty="0">
-                <a:solidFill>
-                  <a:schemeClr val="tx1"/>
-                </a:solidFill>
+              <a:rPr lang="en-US" sz="5250" dirty="0">
+                <a:ea typeface="MS PGothic"/>
+                <a:cs typeface="Segoe UI"/>
               </a:rPr>
-              <a:t>The summary</a:t>
-            </a:r>
-          </a:p>
-        </p:txBody>
-      </p:sp>
-      <p:sp>
-        <p:nvSpPr>
-          <p:cNvPr id="9" name="TextBox 8">
-            <a:extLst>
-              <a:ext uri="{FF2B5EF4-FFF2-40B4-BE49-F238E27FC236}">
-                <a16:creationId xmlns:a16="http://schemas.microsoft.com/office/drawing/2014/main" id="{89E61DD1-5753-5741-AA9D-3936F4C4D894}"/>
-              </a:ext>
-            </a:extLst>
-          </p:cNvPr>
-          <p:cNvSpPr txBox="1"/>
-          <p:nvPr/>
+              <a:t>Conclusion</a:t>
+            </a:r>
+            <a:endParaRPr lang="en-US" sz="5250" dirty="0"/>
+          </a:p>
+        </p:txBody>
+      </p:sp>
+      <p:sp>
+        <p:nvSpPr>
+          <p:cNvPr id="5" name="Text Placeholder 4"/>
+          <p:cNvSpPr>
+            <a:spLocks noGrp="1"/>
+          </p:cNvSpPr>
+          <p:nvPr>
+            <p:ph type="body" sz="quarter" idx="4294967295"/>
+          </p:nvPr>
         </p:nvSpPr>
         <p:spPr>
           <a:xfrm>
-            <a:off x="8875266" y="6290026"/>
-            <a:ext cx="2702663" cy="276999"/>
+            <a:off x="588263" y="1189038"/>
+            <a:ext cx="11603737" cy="4385047"/>
           </a:xfrm>
-          <a:prstGeom prst="rect">
-            <a:avLst/>
-          </a:prstGeom>
-          <a:noFill/>
         </p:spPr>
         <p:txBody>
-          <a:bodyPr wrap="none" lIns="0" tIns="0" rIns="0" bIns="0" rtlCol="0">
+          <a:bodyPr vert="horz" wrap="square" lIns="146304" tIns="91440" rIns="146304" bIns="91440" rtlCol="0" anchor="t">
             <a:spAutoFit/>
           </a:bodyPr>
           <a:lstStyle/>
           <a:p>
-            <a:r>
-              <a:rPr lang="en-US" sz="900" dirty="0">
+            <a:pPr marL="335915" indent="-335915"/>
+            <a:r>
+              <a:rPr lang="en-US" sz="2400" dirty="0">
+                <a:ea typeface="MS PGothic"/>
+                <a:cs typeface="+mj-lt"/>
+              </a:rPr>
+              <a:t>Monitoring business critical services</a:t>
+            </a:r>
+            <a:endParaRPr lang="en-US" sz="2400" dirty="0">
+              <a:solidFill>
+                <a:srgbClr val="505050"/>
+              </a:solidFill>
+              <a:latin typeface="Segoe UI Light"/>
+              <a:ea typeface="MS PGothic"/>
+              <a:cs typeface="Segoe UI Light"/>
+            </a:endParaRPr>
+          </a:p>
+          <a:p>
+            <a:pPr marL="572135" lvl="1" indent="-236220"/>
+            <a:r>
+              <a:rPr lang="en-US" sz="2000" dirty="0">
                 <a:solidFill>
-                  <a:schemeClr val="accent6">
-                    <a:lumMod val="75000"/>
-                  </a:schemeClr>
+                  <a:srgbClr val="505050"/>
                 </a:solidFill>
+                <a:latin typeface="Segoe UI Light"/>
+                <a:ea typeface="MS PGothic"/>
+                <a:cs typeface="Segoe UI Light"/>
               </a:rPr>
-              <a:t>Icon credits: https://www.flaticon.com/authors/freepik</a:t>
-            </a:r>
-          </a:p>
-          <a:p>
-            <a:r>
-              <a:rPr lang="en-US" sz="900" dirty="0">
+              <a:t>Collect minimum analytics for production apps</a:t>
+            </a:r>
+          </a:p>
+          <a:p>
+            <a:pPr marL="572135" lvl="1" indent="-236220"/>
+            <a:r>
+              <a:rPr lang="en-US" sz="2000" dirty="0">
                 <a:solidFill>
-                  <a:schemeClr val="accent6">
-                    <a:lumMod val="75000"/>
-                  </a:schemeClr>
+                  <a:srgbClr val="505050"/>
                 </a:solidFill>
+                <a:latin typeface="Segoe UI Light"/>
+                <a:ea typeface="MS PGothic"/>
+                <a:cs typeface="Segoe UI Light"/>
               </a:rPr>
-              <a:t>Icon credits: https://</a:t>
-            </a:r>
-            <a:r>
-              <a:rPr lang="en-US" sz="900" dirty="0" err="1">
+              <a:t>Tip: Set </a:t>
+            </a:r>
+            <a:r>
+              <a:rPr lang="en-US" sz="2000" u="sng" dirty="0">
                 <a:solidFill>
-                  <a:schemeClr val="accent6">
-                    <a:lumMod val="75000"/>
-                  </a:schemeClr>
+                  <a:srgbClr val="505050"/>
                 </a:solidFill>
+                <a:latin typeface="Segoe UI Light"/>
+                <a:ea typeface="MS PGothic"/>
+                <a:cs typeface="Segoe UI Light"/>
               </a:rPr>
-              <a:t>www.flaticon.com</a:t>
-            </a:r>
-            <a:r>
-              <a:rPr lang="en-US" sz="900" dirty="0">
+              <a:t>data cap</a:t>
+            </a:r>
+            <a:r>
+              <a:rPr lang="en-US" sz="2000" dirty="0">
                 <a:solidFill>
-                  <a:schemeClr val="accent6">
-                    <a:lumMod val="75000"/>
-                  </a:schemeClr>
+                  <a:srgbClr val="505050"/>
                 </a:solidFill>
+                <a:latin typeface="Segoe UI Light"/>
+                <a:ea typeface="MS PGothic"/>
+                <a:cs typeface="Segoe UI Light"/>
               </a:rPr>
-              <a:t>/authors/flat-icons</a:t>
-            </a:r>
-          </a:p>
-        </p:txBody>
-      </p:sp>
-      <p:grpSp>
-        <p:nvGrpSpPr>
-          <p:cNvPr id="18" name="Group 17">
-            <a:extLst>
-              <a:ext uri="{FF2B5EF4-FFF2-40B4-BE49-F238E27FC236}">
-                <a16:creationId xmlns:a16="http://schemas.microsoft.com/office/drawing/2014/main" id="{E91BF864-5B62-A44C-9FA6-D12782158DB4}"/>
-              </a:ext>
-            </a:extLst>
-          </p:cNvPr>
-          <p:cNvGrpSpPr/>
-          <p:nvPr/>
-        </p:nvGrpSpPr>
-        <p:grpSpPr>
-          <a:xfrm>
-            <a:off x="1121915" y="2742545"/>
-            <a:ext cx="3000951" cy="3265544"/>
-            <a:chOff x="1121915" y="2742545"/>
-            <a:chExt cx="3000951" cy="3265544"/>
-          </a:xfrm>
-        </p:grpSpPr>
-        <p:sp>
-          <p:nvSpPr>
-            <p:cNvPr id="80" name="Rectangle 79">
-              <a:extLst>
-                <a:ext uri="{FF2B5EF4-FFF2-40B4-BE49-F238E27FC236}">
-                  <a16:creationId xmlns:a16="http://schemas.microsoft.com/office/drawing/2014/main" id="{C0CE77D3-E579-434C-AA80-DD9F34F638BB}"/>
-                </a:ext>
-              </a:extLst>
-            </p:cNvPr>
-            <p:cNvSpPr/>
-            <p:nvPr/>
-          </p:nvSpPr>
-          <p:spPr bwMode="auto">
-            <a:xfrm>
-              <a:off x="1121915" y="4331016"/>
-              <a:ext cx="3000951" cy="1677073"/>
-            </a:xfrm>
-            <a:prstGeom prst="rect">
-              <a:avLst/>
-            </a:prstGeom>
-            <a:noFill/>
-            <a:ln>
-              <a:noFill/>
-              <a:headEnd type="none" w="med" len="med"/>
-              <a:tailEnd type="none" w="med" len="med"/>
-            </a:ln>
-            <a:effectLst/>
-          </p:spPr>
-          <p:style>
-            <a:lnRef idx="1">
-              <a:schemeClr val="accent2"/>
-            </a:lnRef>
-            <a:fillRef idx="3">
-              <a:schemeClr val="accent2"/>
-            </a:fillRef>
-            <a:effectRef idx="2">
-              <a:schemeClr val="accent2"/>
-            </a:effectRef>
-            <a:fontRef idx="minor">
-              <a:schemeClr val="lt1"/>
-            </a:fontRef>
-          </p:style>
-          <p:txBody>
-            <a:bodyPr rot="0" spcFirstLastPara="0" vertOverflow="overflow" horzOverflow="overflow" vert="horz" wrap="square" lIns="175715" tIns="140572" rIns="175715" bIns="140572" numCol="1" spcCol="0" rtlCol="0" fromWordArt="0" anchor="t" anchorCtr="0" forceAA="0" compatLnSpc="1">
-              <a:prstTxWarp prst="textNoShape">
-                <a:avLst/>
-              </a:prstTxWarp>
-              <a:noAutofit/>
-            </a:bodyPr>
-            <a:lstStyle/>
-            <a:p>
-              <a:pPr algn="ctr" defTabSz="896171">
-                <a:lnSpc>
-                  <a:spcPct val="90000"/>
-                </a:lnSpc>
-                <a:defRPr/>
-              </a:pPr>
-              <a:r>
-                <a:rPr lang="en-US" sz="2000" dirty="0">
-                  <a:ln w="139700">
-                    <a:noFill/>
-                  </a:ln>
-                  <a:solidFill>
-                    <a:schemeClr val="accent4"/>
-                  </a:solidFill>
-                  <a:latin typeface="Segoe UI Semilight"/>
-                </a:rPr>
-                <a:t>Automate infrastructure components with </a:t>
-              </a:r>
-              <a:r>
-                <a:rPr lang="en-US" sz="2000" dirty="0" err="1">
-                  <a:ln w="139700">
-                    <a:noFill/>
-                  </a:ln>
-                  <a:solidFill>
-                    <a:schemeClr val="accent4"/>
-                  </a:solidFill>
-                  <a:latin typeface="Segoe UI Semilight"/>
-                </a:rPr>
-                <a:t>IaC</a:t>
-              </a:r>
-              <a:endParaRPr lang="en-US" sz="2000" dirty="0" err="1">
-                <a:ln w="139700">
-                  <a:noFill/>
-                </a:ln>
+              <a:t> and </a:t>
+            </a:r>
+            <a:r>
+              <a:rPr lang="en-US" sz="2000" u="sng" dirty="0">
                 <a:solidFill>
-                  <a:schemeClr val="accent4"/>
+                  <a:srgbClr val="505050"/>
                 </a:solidFill>
-                <a:latin typeface="Segoe UI Semilight"/>
-                <a:cs typeface="Segoe UI Semilight"/>
-              </a:endParaRPr>
-            </a:p>
-          </p:txBody>
-        </p:sp>
-        <p:pic>
-          <p:nvPicPr>
-            <p:cNvPr id="8" name="Picture 7">
-              <a:extLst>
-                <a:ext uri="{FF2B5EF4-FFF2-40B4-BE49-F238E27FC236}">
-                  <a16:creationId xmlns:a16="http://schemas.microsoft.com/office/drawing/2014/main" id="{216BDA69-7083-3843-8594-F395C8C8A4D2}"/>
-                </a:ext>
-              </a:extLst>
-            </p:cNvPr>
-            <p:cNvPicPr>
-              <a:picLocks noChangeAspect="1"/>
-            </p:cNvPicPr>
-            <p:nvPr/>
-          </p:nvPicPr>
-          <p:blipFill>
-            <a:blip r:embed="rId3"/>
-            <a:stretch>
-              <a:fillRect/>
-            </a:stretch>
-          </p:blipFill>
-          <p:spPr>
-            <a:xfrm>
-              <a:off x="2172390" y="2742545"/>
-              <a:ext cx="900000" cy="900000"/>
-            </a:xfrm>
-            <a:prstGeom prst="rect">
-              <a:avLst/>
-            </a:prstGeom>
-          </p:spPr>
-        </p:pic>
-      </p:grpSp>
-      <p:grpSp>
-        <p:nvGrpSpPr>
-          <p:cNvPr id="19" name="Group 18">
-            <a:extLst>
-              <a:ext uri="{FF2B5EF4-FFF2-40B4-BE49-F238E27FC236}">
-                <a16:creationId xmlns:a16="http://schemas.microsoft.com/office/drawing/2014/main" id="{913DF78E-084D-6B4B-9667-DBB21294D388}"/>
-              </a:ext>
-            </a:extLst>
-          </p:cNvPr>
-          <p:cNvGrpSpPr/>
-          <p:nvPr/>
-        </p:nvGrpSpPr>
-        <p:grpSpPr>
-          <a:xfrm>
-            <a:off x="4543014" y="2742545"/>
-            <a:ext cx="3000951" cy="3265544"/>
-            <a:chOff x="4543014" y="2742545"/>
-            <a:chExt cx="3000951" cy="3265544"/>
-          </a:xfrm>
-        </p:grpSpPr>
-        <p:sp>
-          <p:nvSpPr>
-            <p:cNvPr id="77" name="TextBox 76">
-              <a:extLst>
-                <a:ext uri="{FF2B5EF4-FFF2-40B4-BE49-F238E27FC236}">
-                  <a16:creationId xmlns:a16="http://schemas.microsoft.com/office/drawing/2014/main" id="{8CB97DDB-B8C7-4920-9175-E429C7EC5A6D}"/>
-                </a:ext>
-              </a:extLst>
-            </p:cNvPr>
-            <p:cNvSpPr txBox="1"/>
-            <p:nvPr/>
-          </p:nvSpPr>
-          <p:spPr>
-            <a:xfrm>
-              <a:off x="4543014" y="4331016"/>
-              <a:ext cx="3000951" cy="1677073"/>
-            </a:xfrm>
-            <a:prstGeom prst="rect">
-              <a:avLst/>
-            </a:prstGeom>
-            <a:noFill/>
-            <a:ln>
-              <a:noFill/>
-              <a:headEnd type="none" w="med" len="med"/>
-              <a:tailEnd type="none" w="med" len="med"/>
-            </a:ln>
-            <a:effectLst/>
-          </p:spPr>
-          <p:style>
-            <a:lnRef idx="1">
-              <a:schemeClr val="accent2"/>
-            </a:lnRef>
-            <a:fillRef idx="3">
-              <a:schemeClr val="accent2"/>
-            </a:fillRef>
-            <a:effectRef idx="2">
-              <a:schemeClr val="accent2"/>
-            </a:effectRef>
-            <a:fontRef idx="minor">
-              <a:schemeClr val="lt1"/>
-            </a:fontRef>
-          </p:style>
-          <p:txBody>
-            <a:bodyPr rot="0" spcFirstLastPara="0" vertOverflow="overflow" horzOverflow="overflow" vert="horz" wrap="square" lIns="175715" tIns="140572" rIns="175715" bIns="140572" numCol="1" spcCol="0" rtlCol="0" fromWordArt="0" anchor="t" anchorCtr="0" forceAA="0" compatLnSpc="1">
-              <a:prstTxWarp prst="textNoShape">
-                <a:avLst/>
-              </a:prstTxWarp>
-              <a:noAutofit/>
-            </a:bodyPr>
-            <a:lstStyle>
-              <a:defPPr>
-                <a:defRPr lang="en-US"/>
-              </a:defPPr>
-              <a:lvl1pPr lvl="0" algn="ctr" defTabSz="914180">
-                <a:lnSpc>
-                  <a:spcPct val="90000"/>
-                </a:lnSpc>
-                <a:defRPr sz="2352">
-                  <a:solidFill>
-                    <a:srgbClr val="0078D7"/>
-                  </a:solidFill>
-                  <a:latin typeface="Segoe Pro SemiLight" panose="020B0402040204020203" pitchFamily="34" charset="0"/>
-                </a:defRPr>
-              </a:lvl1pPr>
-              <a:lvl2pPr>
-                <a:defRPr>
-                  <a:solidFill>
-                    <a:schemeClr val="lt1"/>
-                  </a:solidFill>
-                </a:defRPr>
-              </a:lvl2pPr>
-              <a:lvl3pPr>
-                <a:defRPr>
-                  <a:solidFill>
-                    <a:schemeClr val="lt1"/>
-                  </a:solidFill>
-                </a:defRPr>
-              </a:lvl3pPr>
-              <a:lvl4pPr>
-                <a:defRPr>
-                  <a:solidFill>
-                    <a:schemeClr val="lt1"/>
-                  </a:solidFill>
-                </a:defRPr>
-              </a:lvl4pPr>
-              <a:lvl5pPr>
-                <a:defRPr>
-                  <a:solidFill>
-                    <a:schemeClr val="lt1"/>
-                  </a:solidFill>
-                </a:defRPr>
-              </a:lvl5pPr>
-              <a:lvl6pPr>
-                <a:defRPr>
-                  <a:solidFill>
-                    <a:schemeClr val="lt1"/>
-                  </a:solidFill>
-                </a:defRPr>
-              </a:lvl6pPr>
-              <a:lvl7pPr>
-                <a:defRPr>
-                  <a:solidFill>
-                    <a:schemeClr val="lt1"/>
-                  </a:solidFill>
-                </a:defRPr>
-              </a:lvl7pPr>
-              <a:lvl8pPr>
-                <a:defRPr>
-                  <a:solidFill>
-                    <a:schemeClr val="lt1"/>
-                  </a:solidFill>
-                </a:defRPr>
-              </a:lvl8pPr>
-              <a:lvl9pPr>
-                <a:defRPr>
-                  <a:solidFill>
-                    <a:schemeClr val="lt1"/>
-                  </a:solidFill>
-                </a:defRPr>
-              </a:lvl9pPr>
-            </a:lstStyle>
-            <a:p>
-              <a:pPr defTabSz="896171">
-                <a:defRPr/>
-              </a:pPr>
-              <a:r>
-                <a:rPr lang="en-US" sz="2000" dirty="0">
-                  <a:ln w="139700">
-                    <a:noFill/>
-                  </a:ln>
-                  <a:solidFill>
-                    <a:schemeClr val="accent4"/>
-                  </a:solidFill>
-                  <a:latin typeface="Segoe UI Semilight"/>
-                  <a:cs typeface="Segoe UI Semilight"/>
-                </a:rPr>
-                <a:t>Monitor and load test proactively</a:t>
-              </a:r>
-              <a:endParaRPr lang="en-US" sz="2000" b="0" i="0" u="none" strike="noStrike" kern="1200" cap="none" spc="0" normalizeH="0" baseline="0" noProof="0" dirty="0">
-                <a:ln w="139700">
-                  <a:noFill/>
-                </a:ln>
+                <a:latin typeface="Segoe UI Light"/>
+                <a:ea typeface="MS PGothic"/>
+                <a:cs typeface="Segoe UI Light"/>
+              </a:rPr>
+              <a:t>retention </a:t>
+            </a:r>
+            <a:r>
+              <a:rPr lang="en-US" sz="2000" dirty="0">
                 <a:solidFill>
-                  <a:schemeClr val="accent4"/>
+                  <a:srgbClr val="505050"/>
                 </a:solidFill>
-                <a:effectLst/>
-                <a:uLnTx/>
-                <a:uFillTx/>
-                <a:latin typeface="Segoe UI Semilight"/>
-                <a:cs typeface="Segoe UI Semilight"/>
-              </a:endParaRPr>
-            </a:p>
-          </p:txBody>
-        </p:sp>
-        <p:pic>
-          <p:nvPicPr>
-            <p:cNvPr id="14" name="Picture 13">
-              <a:extLst>
-                <a:ext uri="{FF2B5EF4-FFF2-40B4-BE49-F238E27FC236}">
-                  <a16:creationId xmlns:a16="http://schemas.microsoft.com/office/drawing/2014/main" id="{0D6306D6-1E7D-9D49-B9CD-C54B125EAE23}"/>
-                </a:ext>
-              </a:extLst>
-            </p:cNvPr>
-            <p:cNvPicPr>
-              <a:picLocks noChangeAspect="1"/>
-            </p:cNvPicPr>
-            <p:nvPr/>
-          </p:nvPicPr>
-          <p:blipFill>
-            <a:blip r:embed="rId4"/>
-            <a:stretch>
-              <a:fillRect/>
-            </a:stretch>
-          </p:blipFill>
-          <p:spPr>
-            <a:xfrm>
-              <a:off x="5548529" y="2742545"/>
-              <a:ext cx="900000" cy="900000"/>
-            </a:xfrm>
-            <a:prstGeom prst="rect">
-              <a:avLst/>
-            </a:prstGeom>
-          </p:spPr>
-        </p:pic>
-      </p:grpSp>
-      <p:grpSp>
-        <p:nvGrpSpPr>
-          <p:cNvPr id="20" name="Group 19">
-            <a:extLst>
-              <a:ext uri="{FF2B5EF4-FFF2-40B4-BE49-F238E27FC236}">
-                <a16:creationId xmlns:a16="http://schemas.microsoft.com/office/drawing/2014/main" id="{A1D1E007-D222-3142-8C56-329FD8D33F89}"/>
-              </a:ext>
-            </a:extLst>
-          </p:cNvPr>
-          <p:cNvGrpSpPr/>
-          <p:nvPr/>
-        </p:nvGrpSpPr>
-        <p:grpSpPr>
-          <a:xfrm>
-            <a:off x="7806265" y="2742545"/>
-            <a:ext cx="3137487" cy="3265544"/>
-            <a:chOff x="7806265" y="2742545"/>
-            <a:chExt cx="3137487" cy="3265544"/>
-          </a:xfrm>
-        </p:grpSpPr>
-        <p:sp>
-          <p:nvSpPr>
-            <p:cNvPr id="82" name="Rectangle 81">
-              <a:extLst>
-                <a:ext uri="{FF2B5EF4-FFF2-40B4-BE49-F238E27FC236}">
-                  <a16:creationId xmlns:a16="http://schemas.microsoft.com/office/drawing/2014/main" id="{F613B813-6076-4D13-A6B2-CFDDD1761A43}"/>
-                </a:ext>
-              </a:extLst>
-            </p:cNvPr>
-            <p:cNvSpPr/>
-            <p:nvPr/>
-          </p:nvSpPr>
-          <p:spPr bwMode="auto">
-            <a:xfrm>
-              <a:off x="7806265" y="4331016"/>
-              <a:ext cx="3137487" cy="1677073"/>
-            </a:xfrm>
-            <a:prstGeom prst="rect">
-              <a:avLst/>
-            </a:prstGeom>
-            <a:noFill/>
-            <a:ln>
-              <a:noFill/>
-              <a:headEnd type="none" w="med" len="med"/>
-              <a:tailEnd type="none" w="med" len="med"/>
-            </a:ln>
-            <a:effectLst/>
-          </p:spPr>
-          <p:style>
-            <a:lnRef idx="1">
-              <a:schemeClr val="accent2"/>
-            </a:lnRef>
-            <a:fillRef idx="3">
-              <a:schemeClr val="accent2"/>
-            </a:fillRef>
-            <a:effectRef idx="2">
-              <a:schemeClr val="accent2"/>
-            </a:effectRef>
-            <a:fontRef idx="minor">
-              <a:schemeClr val="lt1"/>
-            </a:fontRef>
-          </p:style>
-          <p:txBody>
-            <a:bodyPr rot="0" spcFirstLastPara="0" vertOverflow="overflow" horzOverflow="overflow" vert="horz" wrap="square" lIns="175715" tIns="140572" rIns="175715" bIns="140572" numCol="1" spcCol="0" rtlCol="0" fromWordArt="0" anchor="t" anchorCtr="0" forceAA="0" compatLnSpc="1">
-              <a:prstTxWarp prst="textNoShape">
-                <a:avLst/>
-              </a:prstTxWarp>
-              <a:noAutofit/>
-            </a:bodyPr>
-            <a:lstStyle/>
-            <a:p>
-              <a:pPr algn="ctr" defTabSz="896171">
-                <a:lnSpc>
-                  <a:spcPct val="90000"/>
-                </a:lnSpc>
-                <a:defRPr/>
-              </a:pPr>
-              <a:r>
-                <a:rPr lang="en-US" sz="2000" dirty="0">
-                  <a:ln w="139700">
-                    <a:noFill/>
-                  </a:ln>
-                  <a:solidFill>
-                    <a:schemeClr val="accent4"/>
-                  </a:solidFill>
-                  <a:latin typeface="Segoe UI Semilight"/>
-                  <a:cs typeface="Segoe UI Semilight"/>
-                </a:rPr>
-                <a:t>Take actions beforehand</a:t>
-              </a:r>
-              <a:endParaRPr lang="en-US" sz="2000" b="0" i="0" u="none" strike="noStrike" kern="1200" cap="none" spc="0" normalizeH="0" baseline="0" noProof="0" dirty="0">
-                <a:ln w="139700">
-                  <a:noFill/>
-                </a:ln>
+                <a:latin typeface="Segoe UI Light"/>
+                <a:ea typeface="MS PGothic"/>
+                <a:cs typeface="Segoe UI Light"/>
+              </a:rPr>
+              <a:t>as per your business requirements</a:t>
+            </a:r>
+          </a:p>
+          <a:p>
+            <a:pPr marL="335915" indent="-335915"/>
+            <a:r>
+              <a:rPr lang="en-US" sz="2400" dirty="0">
                 <a:solidFill>
-                  <a:schemeClr val="accent4"/>
+                  <a:srgbClr val="505050"/>
                 </a:solidFill>
-                <a:effectLst/>
-                <a:uLnTx/>
-                <a:uFillTx/>
-                <a:latin typeface="Segoe UI Semilight"/>
-                <a:cs typeface="Segoe UI Semilight"/>
-              </a:endParaRPr>
-            </a:p>
-          </p:txBody>
-        </p:sp>
-        <p:pic>
-          <p:nvPicPr>
-            <p:cNvPr id="17" name="Picture 16">
-              <a:extLst>
-                <a:ext uri="{FF2B5EF4-FFF2-40B4-BE49-F238E27FC236}">
-                  <a16:creationId xmlns:a16="http://schemas.microsoft.com/office/drawing/2014/main" id="{A1316900-6E39-4343-A71D-5A50BA59042F}"/>
-                </a:ext>
-              </a:extLst>
-            </p:cNvPr>
-            <p:cNvPicPr>
-              <a:picLocks noChangeAspect="1"/>
-            </p:cNvPicPr>
-            <p:nvPr/>
-          </p:nvPicPr>
-          <p:blipFill>
-            <a:blip r:embed="rId5"/>
-            <a:stretch>
-              <a:fillRect/>
-            </a:stretch>
-          </p:blipFill>
-          <p:spPr>
-            <a:xfrm>
-              <a:off x="8919125" y="2742545"/>
-              <a:ext cx="900000" cy="900000"/>
-            </a:xfrm>
-            <a:prstGeom prst="rect">
-              <a:avLst/>
-            </a:prstGeom>
-          </p:spPr>
-        </p:pic>
-      </p:grpSp>
+                <a:latin typeface="Segoe UI Light"/>
+                <a:ea typeface="MS PGothic"/>
+                <a:cs typeface="Segoe UI Light"/>
+              </a:rPr>
+              <a:t>Alerts on service performance metrics</a:t>
+            </a:r>
+          </a:p>
+          <a:p>
+            <a:pPr marL="572135" lvl="1" indent="-236220"/>
+            <a:r>
+              <a:rPr lang="en-US" sz="2000" dirty="0">
+                <a:solidFill>
+                  <a:srgbClr val="505050"/>
+                </a:solidFill>
+                <a:latin typeface="Segoe UI Light"/>
+                <a:ea typeface="MS PGothic"/>
+                <a:cs typeface="Segoe UI Light"/>
+              </a:rPr>
+              <a:t>Setup email alerts</a:t>
+            </a:r>
+            <a:endParaRPr lang="en-US" sz="850" dirty="0">
+              <a:solidFill>
+                <a:srgbClr val="505050"/>
+              </a:solidFill>
+              <a:latin typeface="Segoe UI Light"/>
+              <a:ea typeface="MS PGothic"/>
+              <a:cs typeface="Segoe UI Light"/>
+            </a:endParaRPr>
+          </a:p>
+          <a:p>
+            <a:pPr marL="335915" indent="-335915"/>
+            <a:r>
+              <a:rPr lang="en-US" sz="2400" dirty="0">
+                <a:solidFill>
+                  <a:srgbClr val="505050"/>
+                </a:solidFill>
+                <a:latin typeface="Segoe UI Light"/>
+                <a:ea typeface="MS PGothic"/>
+                <a:cs typeface="Segoe UI Light"/>
+              </a:rPr>
+              <a:t>Auto-scale where required</a:t>
+            </a:r>
+          </a:p>
+          <a:p>
+            <a:pPr marL="572135" lvl="1" indent="-236220"/>
+            <a:r>
+              <a:rPr lang="en-US" sz="2000" dirty="0">
+                <a:solidFill>
+                  <a:srgbClr val="505050"/>
+                </a:solidFill>
+                <a:latin typeface="Segoe UI Light"/>
+                <a:ea typeface="MS PGothic"/>
+                <a:cs typeface="Segoe UI Light"/>
+              </a:rPr>
+              <a:t>Memory consumption metric works best</a:t>
+            </a:r>
+            <a:endParaRPr lang="en-US" sz="850" dirty="0">
+              <a:solidFill>
+                <a:srgbClr val="505050"/>
+              </a:solidFill>
+              <a:latin typeface="Segoe UI Light"/>
+              <a:ea typeface="MS PGothic"/>
+              <a:cs typeface="Segoe UI Light"/>
+            </a:endParaRPr>
+          </a:p>
+          <a:p>
+            <a:pPr marL="335915" indent="-335915"/>
+            <a:r>
+              <a:rPr lang="en-US" sz="2400" dirty="0">
+                <a:solidFill>
+                  <a:srgbClr val="505050"/>
+                </a:solidFill>
+                <a:latin typeface="Segoe UI Light"/>
+                <a:ea typeface="MS PGothic"/>
+                <a:cs typeface="Segoe UI Light"/>
+              </a:rPr>
+              <a:t>Utilize load testing proactively</a:t>
+            </a:r>
+          </a:p>
+          <a:p>
+            <a:pPr marL="572135" lvl="1" indent="-236220"/>
+            <a:r>
+              <a:rPr lang="en-US" sz="2000" dirty="0">
+                <a:solidFill>
+                  <a:srgbClr val="505050"/>
+                </a:solidFill>
+                <a:latin typeface="Segoe UI Light"/>
+                <a:ea typeface="MS PGothic"/>
+                <a:cs typeface="Segoe UI Light"/>
+              </a:rPr>
+              <a:t>Setup </a:t>
+            </a:r>
+            <a:r>
+              <a:rPr lang="en-US" sz="2000" u="sng" dirty="0">
+                <a:solidFill>
+                  <a:srgbClr val="505050"/>
+                </a:solidFill>
+                <a:latin typeface="Segoe UI Light"/>
+                <a:ea typeface="MS PGothic"/>
+                <a:cs typeface="Segoe UI Light"/>
+              </a:rPr>
+              <a:t>Azure load testing </a:t>
+            </a:r>
+            <a:r>
+              <a:rPr lang="en-US" sz="2000" dirty="0">
+                <a:solidFill>
+                  <a:srgbClr val="505050"/>
+                </a:solidFill>
+                <a:latin typeface="Segoe UI Light"/>
+                <a:ea typeface="MS PGothic"/>
+                <a:cs typeface="Segoe UI Light"/>
+              </a:rPr>
+              <a:t>or use </a:t>
+            </a:r>
+            <a:r>
+              <a:rPr lang="en-US" sz="2000" u="sng" dirty="0">
+                <a:solidFill>
+                  <a:srgbClr val="505050"/>
+                </a:solidFill>
+                <a:latin typeface="Segoe UI Light"/>
+                <a:ea typeface="MS PGothic"/>
+                <a:cs typeface="Segoe UI Light"/>
+              </a:rPr>
+              <a:t>availability testing</a:t>
+            </a:r>
+            <a:r>
+              <a:rPr lang="en-US" sz="2000" dirty="0">
+                <a:solidFill>
+                  <a:srgbClr val="505050"/>
+                </a:solidFill>
+                <a:latin typeface="Segoe UI Light"/>
+                <a:ea typeface="MS PGothic"/>
+                <a:cs typeface="Segoe UI Light"/>
+              </a:rPr>
+              <a:t> under app service</a:t>
+            </a:r>
+            <a:endParaRPr lang="en-US" sz="850" dirty="0">
+              <a:solidFill>
+                <a:srgbClr val="505050"/>
+              </a:solidFill>
+              <a:latin typeface="Segoe UI Light"/>
+              <a:ea typeface="MS PGothic"/>
+              <a:cs typeface="Segoe UI Light"/>
+            </a:endParaRPr>
+          </a:p>
+          <a:p>
+            <a:pPr marL="335915" indent="-335915"/>
+            <a:endParaRPr lang="en-US" sz="2400" dirty="0">
+              <a:solidFill>
+                <a:srgbClr val="505050"/>
+              </a:solidFill>
+              <a:latin typeface="Segoe UI Light"/>
+              <a:ea typeface="MS PGothic"/>
+              <a:cs typeface="Segoe UI Light"/>
+            </a:endParaRPr>
+          </a:p>
+          <a:p>
+            <a:pPr marL="0" indent="0">
+              <a:buNone/>
+            </a:pPr>
+            <a:endParaRPr lang="en-US" sz="2400" dirty="0">
+              <a:solidFill>
+                <a:srgbClr val="505050"/>
+              </a:solidFill>
+              <a:latin typeface="Segoe UI Light"/>
+              <a:ea typeface="MS PGothic"/>
+              <a:cs typeface="Segoe UI Light"/>
+            </a:endParaRPr>
+          </a:p>
+          <a:p>
+            <a:pPr marL="572135" lvl="1" indent="-236220"/>
+            <a:endParaRPr lang="en-US" sz="850" dirty="0">
+              <a:solidFill>
+                <a:srgbClr val="3C3C3C"/>
+              </a:solidFill>
+              <a:latin typeface="Segoe UI Light"/>
+              <a:ea typeface="MS PGothic"/>
+              <a:cs typeface="Segoe UI Light"/>
+            </a:endParaRPr>
+          </a:p>
+        </p:txBody>
+      </p:sp>
     </p:spTree>
     <p:extLst>
       <p:ext uri="{BB962C8B-B14F-4D97-AF65-F5344CB8AC3E}">
-        <p14:creationId xmlns:p14="http://schemas.microsoft.com/office/powerpoint/2010/main" val="4282228039"/>
+        <p14:creationId xmlns:p14="http://schemas.microsoft.com/office/powerpoint/2010/main" val="254075516"/>
       </p:ext>
     </p:extLst>
   </p:cSld>
   <p:clrMapOvr>
     <a:masterClrMapping/>
   </p:clrMapOvr>
-  <mc:AlternateContent xmlns:mc="http://schemas.openxmlformats.org/markup-compatibility/2006" xmlns:p14="http://schemas.microsoft.com/office/powerpoint/2010/main">
-    <mc:Choice Requires="p14">
-      <p:transition spd="med" p14:dur="700">
-        <p:fade/>
-      </p:transition>
-    </mc:Choice>
-    <mc:Fallback xmlns="">
-      <p:transition spd="med">
-        <p:fade/>
-      </p:transition>
-    </mc:Fallback>
-  </mc:AlternateContent>
-  <p:timing>
-    <p:tnLst>
-      <p:par>
-        <p:cTn id="1" dur="indefinite" restart="never" nodeType="tmRoot">
-          <p:childTnLst>
-            <p:seq concurrent="1" nextAc="seek">
-              <p:cTn id="2" dur="indefinite" nodeType="mainSeq">
-                <p:childTnLst>
-                  <p:par>
-                    <p:cTn id="3" fill="hold">
-                      <p:stCondLst>
-                        <p:cond delay="indefinite"/>
-                      </p:stCondLst>
-                      <p:childTnLst>
-                        <p:par>
-                          <p:cTn id="4" fill="hold">
-                            <p:stCondLst>
-                              <p:cond delay="0"/>
-                            </p:stCondLst>
-                            <p:childTnLst>
-                              <p:par>
-                                <p:cTn id="5" presetID="10" presetClass="entr" presetSubtype="0" fill="hold" nodeType="clickEffect">
-                                  <p:stCondLst>
-                                    <p:cond delay="0"/>
-                                  </p:stCondLst>
-                                  <p:childTnLst>
-                                    <p:set>
-                                      <p:cBhvr>
-                                        <p:cTn id="6" dur="1" fill="hold">
-                                          <p:stCondLst>
-                                            <p:cond delay="0"/>
-                                          </p:stCondLst>
-                                        </p:cTn>
-                                        <p:tgtEl>
-                                          <p:spTgt spid="18"/>
-                                        </p:tgtEl>
-                                        <p:attrNameLst>
-                                          <p:attrName>style.visibility</p:attrName>
-                                        </p:attrNameLst>
-                                      </p:cBhvr>
-                                      <p:to>
-                                        <p:strVal val="visible"/>
-                                      </p:to>
-                                    </p:set>
-                                    <p:animEffect transition="in" filter="fade">
-                                      <p:cBhvr>
-                                        <p:cTn id="7" dur="500"/>
-                                        <p:tgtEl>
-                                          <p:spTgt spid="18"/>
-                                        </p:tgtEl>
-                                      </p:cBhvr>
-                                    </p:animEffect>
-                                  </p:childTnLst>
-                                </p:cTn>
-                              </p:par>
-                            </p:childTnLst>
-                          </p:cTn>
-                        </p:par>
-                      </p:childTnLst>
-                    </p:cTn>
-                  </p:par>
-                  <p:par>
-                    <p:cTn id="8" fill="hold">
-                      <p:stCondLst>
-                        <p:cond delay="indefinite"/>
-                      </p:stCondLst>
-                      <p:childTnLst>
-                        <p:par>
-                          <p:cTn id="9" fill="hold">
-                            <p:stCondLst>
-                              <p:cond delay="0"/>
-                            </p:stCondLst>
-                            <p:childTnLst>
-                              <p:par>
-                                <p:cTn id="10" presetID="10" presetClass="entr" presetSubtype="0" fill="hold" nodeType="clickEffect">
-                                  <p:stCondLst>
-                                    <p:cond delay="0"/>
-                                  </p:stCondLst>
-                                  <p:childTnLst>
-                                    <p:set>
-                                      <p:cBhvr>
-                                        <p:cTn id="11" dur="1" fill="hold">
-                                          <p:stCondLst>
-                                            <p:cond delay="0"/>
-                                          </p:stCondLst>
-                                        </p:cTn>
-                                        <p:tgtEl>
-                                          <p:spTgt spid="19"/>
-                                        </p:tgtEl>
-                                        <p:attrNameLst>
-                                          <p:attrName>style.visibility</p:attrName>
-                                        </p:attrNameLst>
-                                      </p:cBhvr>
-                                      <p:to>
-                                        <p:strVal val="visible"/>
-                                      </p:to>
-                                    </p:set>
-                                    <p:animEffect transition="in" filter="fade">
-                                      <p:cBhvr>
-                                        <p:cTn id="12" dur="500"/>
-                                        <p:tgtEl>
-                                          <p:spTgt spid="19"/>
-                                        </p:tgtEl>
-                                      </p:cBhvr>
-                                    </p:animEffect>
-                                  </p:childTnLst>
-                                </p:cTn>
-                              </p:par>
-                            </p:childTnLst>
-                          </p:cTn>
-                        </p:par>
-                      </p:childTnLst>
-                    </p:cTn>
-                  </p:par>
-                  <p:par>
-                    <p:cTn id="13" fill="hold">
-                      <p:stCondLst>
-                        <p:cond delay="indefinite"/>
-                      </p:stCondLst>
-                      <p:childTnLst>
-                        <p:par>
-                          <p:cTn id="14" fill="hold">
-                            <p:stCondLst>
-                              <p:cond delay="0"/>
-                            </p:stCondLst>
-                            <p:childTnLst>
-                              <p:par>
-                                <p:cTn id="15" presetID="10" presetClass="entr" presetSubtype="0" fill="hold" nodeType="clickEffect">
-                                  <p:stCondLst>
-                                    <p:cond delay="0"/>
-                                  </p:stCondLst>
-                                  <p:childTnLst>
-                                    <p:set>
-                                      <p:cBhvr>
-                                        <p:cTn id="16" dur="1" fill="hold">
-                                          <p:stCondLst>
-                                            <p:cond delay="0"/>
-                                          </p:stCondLst>
-                                        </p:cTn>
-                                        <p:tgtEl>
-                                          <p:spTgt spid="20"/>
-                                        </p:tgtEl>
-                                        <p:attrNameLst>
-                                          <p:attrName>style.visibility</p:attrName>
-                                        </p:attrNameLst>
-                                      </p:cBhvr>
-                                      <p:to>
-                                        <p:strVal val="visible"/>
-                                      </p:to>
-                                    </p:set>
-                                    <p:animEffect transition="in" filter="fade">
-                                      <p:cBhvr>
-                                        <p:cTn id="17" dur="500"/>
-                                        <p:tgtEl>
-                                          <p:spTgt spid="20"/>
-                                        </p:tgtEl>
-                                      </p:cBhvr>
-                                    </p:animEffect>
-                                  </p:childTnLst>
-                                </p:cTn>
-                              </p:par>
-                            </p:childTnLst>
-                          </p:cTn>
-                        </p:par>
-                      </p:childTnLst>
-                    </p:cTn>
-                  </p:par>
-                </p:childTnLst>
-              </p:cTn>
-              <p:prevCondLst>
-                <p:cond evt="onPrev" delay="0">
-                  <p:tgtEl>
-                    <p:sldTgt/>
-                  </p:tgtEl>
-                </p:cond>
-              </p:prevCondLst>
-              <p:nextCondLst>
-                <p:cond evt="onNext" delay="0">
-                  <p:tgtEl>
-                    <p:sldTgt/>
-                  </p:tgtEl>
-                </p:cond>
-              </p:nextCondLst>
-            </p:seq>
-          </p:childTnLst>
-        </p:cTn>
-      </p:par>
-    </p:tnLst>
-  </p:timing>
+  <p:transition>
+    <p:fade/>
+  </p:transition>
 </p:sld>
 </file>
 
@@ -16035,7 +15556,7 @@
         <p:spPr>
           <a:xfrm>
             <a:off x="588263" y="1189038"/>
-            <a:ext cx="11603737" cy="4859022"/>
+            <a:ext cx="11603737" cy="5265288"/>
           </a:xfrm>
         </p:spPr>
         <p:txBody>
@@ -16104,33 +15625,7 @@
                 <a:ea typeface="MS PGothic"/>
                 <a:cs typeface="+mj-lt"/>
               </a:rPr>
-              <a:t>Anticipate traffic during </a:t>
-            </a:r>
-            <a:r>
-              <a:rPr lang="en-US" sz="2000">
-                <a:solidFill>
-                  <a:schemeClr val="tx1">
-                    <a:lumMod val="75000"/>
-                  </a:schemeClr>
-                </a:solidFill>
-                <a:latin typeface="Segoe UI Light"/>
-                <a:ea typeface="MS PGothic"/>
-                <a:cs typeface="+mj-lt"/>
-              </a:rPr>
-              <a:t>festivals</a:t>
-            </a:r>
-            <a:r>
-              <a:rPr lang="en-US" sz="2000" dirty="0">
-                <a:solidFill>
-                  <a:schemeClr val="tx1">
-                    <a:lumMod val="75000"/>
-                  </a:schemeClr>
-                </a:solidFill>
-                <a:latin typeface="Segoe UI Light"/>
-                <a:ea typeface="MS PGothic"/>
-                <a:cs typeface="+mj-lt"/>
-              </a:rPr>
-              <a:t> or holidays and schedule scale beforehand.</a:t>
+              <a:t>Anticipate traffic during festivals or holidays and schedule scale beforehand.</a:t>
             </a:r>
             <a:endParaRPr lang="en-US" dirty="0">
               <a:solidFill>
@@ -16195,6 +15690,15 @@
             <a:pPr marL="0" indent="0">
               <a:buNone/>
             </a:pPr>
+            <a:endParaRPr lang="en-US" sz="2400" dirty="0">
+              <a:ea typeface="+mj-lt"/>
+              <a:cs typeface="+mj-lt"/>
+            </a:endParaRPr>
+          </a:p>
+          <a:p>
+            <a:pPr marL="0" indent="0">
+              <a:buNone/>
+            </a:pPr>
             <a:r>
               <a:rPr lang="en-US" sz="2400" dirty="0">
                 <a:ea typeface="+mj-lt"/>
@@ -16272,7 +15776,7 @@
             <a:avLst/>
           </a:prstGeom>
           <a:solidFill>
-            <a:srgbClr val="FFC000"/>
+            <a:srgbClr val="FFFF00"/>
           </a:solidFill>
           <a:ln w="12700">
             <a:solidFill>
@@ -16349,6 +15853,90 @@
               </a:gradFill>
               <a:ea typeface="Segoe UI" pitchFamily="34" charset="0"/>
               <a:cs typeface="Segoe UI" pitchFamily="34" charset="0"/>
+            </a:endParaRPr>
+          </a:p>
+        </p:txBody>
+      </p:sp>
+      <p:sp>
+        <p:nvSpPr>
+          <p:cNvPr id="3" name="Rectangle 2">
+            <a:extLst>
+              <a:ext uri="{FF2B5EF4-FFF2-40B4-BE49-F238E27FC236}">
+                <a16:creationId xmlns:a16="http://schemas.microsoft.com/office/drawing/2014/main" id="{669BB096-7E68-EB62-F35D-BCF3615247B8}"/>
+              </a:ext>
+            </a:extLst>
+          </p:cNvPr>
+          <p:cNvSpPr/>
+          <p:nvPr/>
+        </p:nvSpPr>
+        <p:spPr bwMode="auto">
+          <a:xfrm>
+            <a:off x="3086560" y="3848558"/>
+            <a:ext cx="6018880" cy="753736"/>
+          </a:xfrm>
+          <a:prstGeom prst="rect">
+            <a:avLst/>
+          </a:prstGeom>
+          <a:solidFill>
+            <a:srgbClr val="0070C0"/>
+          </a:solidFill>
+          <a:ln w="12700">
+            <a:solidFill>
+              <a:srgbClr val="4472C4"/>
+            </a:solidFill>
+            <a:headEnd type="none" w="med" len="med"/>
+            <a:tailEnd type="none" w="med" len="med"/>
+          </a:ln>
+          <a:effectLst/>
+        </p:spPr>
+        <p:style>
+          <a:lnRef idx="1">
+            <a:schemeClr val="accent2"/>
+          </a:lnRef>
+          <a:fillRef idx="3">
+            <a:schemeClr val="accent2"/>
+          </a:fillRef>
+          <a:effectRef idx="2">
+            <a:schemeClr val="accent2"/>
+          </a:effectRef>
+          <a:fontRef idx="minor">
+            <a:schemeClr val="lt1"/>
+          </a:fontRef>
+        </p:style>
+        <p:txBody>
+          <a:bodyPr rot="0" spcFirstLastPara="0" vertOverflow="overflow" horzOverflow="overflow" vert="horz" wrap="square" lIns="182880" tIns="146304" rIns="182880" bIns="146304" numCol="1" spcCol="0" rtlCol="0" fromWordArt="0" anchor="t" anchorCtr="0" forceAA="0" compatLnSpc="1">
+            <a:prstTxWarp prst="textNoShape">
+              <a:avLst/>
+            </a:prstTxWarp>
+            <a:noAutofit/>
+          </a:bodyPr>
+          <a:lstStyle/>
+          <a:p>
+            <a:pPr algn="ctr" defTabSz="932472">
+              <a:lnSpc>
+                <a:spcPct val="90000"/>
+              </a:lnSpc>
+              <a:spcBef>
+                <a:spcPct val="0"/>
+              </a:spcBef>
+              <a:spcAft>
+                <a:spcPct val="0"/>
+              </a:spcAft>
+            </a:pPr>
+            <a:r>
+              <a:rPr lang="en-US" sz="1600" dirty="0">
+                <a:solidFill>
+                  <a:schemeClr val="bg1"/>
+                </a:solidFill>
+                <a:latin typeface="Segoe UI Light"/>
+              </a:rPr>
+              <a:t>Tip: Do not opt for Zone redundancy when setting a new app service plan. You may not need it just yet!</a:t>
+            </a:r>
+            <a:endParaRPr lang="en-US">
+              <a:solidFill>
+                <a:schemeClr val="bg1"/>
+              </a:solidFill>
+              <a:cs typeface="Segoe UI"/>
             </a:endParaRPr>
           </a:p>
         </p:txBody>

</xml_diff>